<commit_message>
added mern vs flask
</commit_message>
<xml_diff>
--- a/GRiD_ Fashion Intelligence Systems_The Ignitors_NIT Rourkela.pptx
+++ b/GRiD_ Fashion Intelligence Systems_The Ignitors_NIT Rourkela.pptx
@@ -17100,7 +17100,7 @@
               <a:t>Team Name     : </a:t>
             </a:r>
             <a:r>
-              <a:rPr lang="en-IN" sz="1900" b="1">
+              <a:rPr lang="en-IN" sz="1900" b="1" dirty="0">
                 <a:solidFill>
                   <a:srgbClr val="FFFFFF"/>
                 </a:solidFill>
@@ -17383,8 +17383,8 @@
         </p:nvSpPr>
         <p:spPr>
           <a:xfrm>
-            <a:off x="5467739" y="3143145"/>
-            <a:ext cx="3085322" cy="307777"/>
+            <a:off x="4757015" y="3143145"/>
+            <a:ext cx="3796046" cy="307777"/>
           </a:xfrm>
           <a:prstGeom prst="rect">
             <a:avLst/>
@@ -17399,7 +17399,15 @@
           <a:p>
             <a:r>
               <a:rPr lang="en-IN" dirty="0"/>
-              <a:t>Aerospike vs Cassandra</a:t>
+              <a:t>Aerospike</a:t>
+            </a:r>
+            <a:r>
+              <a:rPr lang="en-IN" b="1" dirty="0"/>
+              <a:t>(Used By Flipkart)</a:t>
+            </a:r>
+            <a:r>
+              <a:rPr lang="en-IN" dirty="0"/>
+              <a:t> vs Cassandra</a:t>
             </a:r>
           </a:p>
         </p:txBody>
@@ -17656,35 +17664,8 @@
                 <a:cs typeface="Roboto Mono"/>
                 <a:sym typeface="Roboto Mono"/>
               </a:rPr>
-              <a:t>For credibility and changing trends, we have to validate the application through designers. So, for this we have also thought of accommodating some extra parameters which would be taken as input from designers.</a:t>
+              <a:t>For credibility and changing trends, we have to validate the application through designers. So, for this we have also thought of accommodating some extra parameters which would be taken as input from designers and used for training a Machine Learning Model.</a:t>
             </a:r>
-          </a:p>
-          <a:p>
-            <a:pPr marL="171450" lvl="0" indent="-171450" algn="l" rtl="0">
-              <a:spcBef>
-                <a:spcPts val="0"/>
-              </a:spcBef>
-              <a:spcAft>
-                <a:spcPts val="0"/>
-              </a:spcAft>
-              <a:buFont typeface="Arial" panose="020B0604020202020204" pitchFamily="34" charset="0"/>
-              <a:buChar char="•"/>
-            </a:pPr>
-            <a:r>
-              <a:rPr lang="en-IN" sz="1200" dirty="0">
-                <a:latin typeface="Roboto Mono"/>
-                <a:ea typeface="Roboto Mono"/>
-                <a:cs typeface="Roboto Mono"/>
-                <a:sym typeface="Roboto Mono"/>
-              </a:rPr>
-              <a:t>The Scrapping code needs to be slightly modified for every new shopping site/article we are using.</a:t>
-            </a:r>
-            <a:endParaRPr sz="1200" dirty="0">
-              <a:latin typeface="Roboto Mono"/>
-              <a:ea typeface="Roboto Mono"/>
-              <a:cs typeface="Roboto Mono"/>
-              <a:sym typeface="Roboto Mono"/>
-            </a:endParaRPr>
           </a:p>
         </p:txBody>
       </p:sp>
@@ -17835,7 +17816,25 @@
                 <a:cs typeface="Roboto Mono"/>
                 <a:sym typeface="Roboto Mono"/>
               </a:rPr>
-              <a:t>The Application Developed will be completely scalable, integrated with Aerospike Database(Hybrid Architecture) used by </a:t>
+              <a:t>The Application Developed will be completely scalable, integrated with </a:t>
+            </a:r>
+            <a:r>
+              <a:rPr lang="en-IN" sz="1200" b="1" dirty="0">
+                <a:latin typeface="Roboto Mono"/>
+                <a:ea typeface="Roboto Mono"/>
+                <a:cs typeface="Roboto Mono"/>
+                <a:sym typeface="Roboto Mono"/>
+              </a:rPr>
+              <a:t>Aerospike Database(Hybrid Architecture) used by</a:t>
+            </a:r>
+            <a:r>
+              <a:rPr lang="en-IN" sz="1200" dirty="0">
+                <a:latin typeface="Roboto Mono"/>
+                <a:ea typeface="Roboto Mono"/>
+                <a:cs typeface="Roboto Mono"/>
+                <a:sym typeface="Roboto Mono"/>
+              </a:rPr>
+              <a:t> </a:t>
             </a:r>
             <a:r>
               <a:rPr lang="en-IN" sz="1200" b="1" dirty="0">
@@ -20452,7 +20451,7 @@
         <p:spPr>
           <a:xfrm>
             <a:off x="0" y="0"/>
-            <a:ext cx="9147578" cy="5143500"/>
+            <a:ext cx="9144000" cy="5143500"/>
           </a:xfrm>
           <a:prstGeom prst="rect">
             <a:avLst/>
@@ -20498,15 +20497,15 @@
               <a:buNone/>
             </a:pPr>
             <a:r>
-              <a:rPr lang="en" sz="2400" b="1">
+              <a:rPr lang="en-IN" sz="2400" b="1" dirty="0">
                 <a:latin typeface="Roboto Mono"/>
                 <a:ea typeface="Roboto Mono"/>
                 <a:cs typeface="Roboto Mono"/>
                 <a:sym typeface="Roboto Mono"/>
               </a:rPr>
-              <a:t>Design/ solution choices</a:t>
+              <a:t>Tech Stack Preference</a:t>
             </a:r>
-            <a:endParaRPr sz="2400" b="1">
+            <a:endParaRPr sz="2400" b="1" dirty="0">
               <a:latin typeface="Roboto Mono"/>
               <a:ea typeface="Roboto Mono"/>
               <a:cs typeface="Roboto Mono"/>
@@ -20515,266 +20514,36 @@
           </a:p>
         </p:txBody>
       </p:sp>
-      <p:sp>
-        <p:nvSpPr>
-          <p:cNvPr id="194" name="Google Shape;194;p38"/>
-          <p:cNvSpPr txBox="1"/>
+      <p:pic>
+        <p:nvPicPr>
+          <p:cNvPr id="3" name="Picture 2">
+            <a:extLst>
+              <a:ext uri="{FF2B5EF4-FFF2-40B4-BE49-F238E27FC236}">
+                <a16:creationId xmlns:a16="http://schemas.microsoft.com/office/drawing/2014/main" id="{54742974-E9E7-4BB0-A71E-F3697BF34C64}"/>
+              </a:ext>
+            </a:extLst>
+          </p:cNvPr>
+          <p:cNvPicPr>
+            <a:picLocks noChangeAspect="1"/>
+          </p:cNvPicPr>
           <p:nvPr/>
-        </p:nvSpPr>
+        </p:nvPicPr>
+        <p:blipFill>
+          <a:blip r:embed="rId4"/>
+          <a:stretch>
+            <a:fillRect/>
+          </a:stretch>
+        </p:blipFill>
         <p:spPr>
           <a:xfrm>
-            <a:off x="75200" y="1082351"/>
-            <a:ext cx="8547000" cy="3258874"/>
+            <a:off x="4868864" y="275119"/>
+            <a:ext cx="3348199" cy="4446169"/>
           </a:xfrm>
           <a:prstGeom prst="rect">
             <a:avLst/>
           </a:prstGeom>
-          <a:noFill/>
-          <a:ln>
-            <a:noFill/>
-          </a:ln>
         </p:spPr>
-        <p:txBody>
-          <a:bodyPr spcFirstLastPara="1" wrap="square" lIns="91425" tIns="91425" rIns="91425" bIns="91425" anchor="ctr" anchorCtr="0">
-            <a:noAutofit/>
-          </a:bodyPr>
-          <a:lstStyle/>
-          <a:p>
-            <a:pPr marL="0" lvl="0" indent="0" algn="l" rtl="0">
-              <a:spcBef>
-                <a:spcPts val="0"/>
-              </a:spcBef>
-              <a:spcAft>
-                <a:spcPts val="0"/>
-              </a:spcAft>
-              <a:buClr>
-                <a:schemeClr val="dk1"/>
-              </a:buClr>
-              <a:buSzPts val="1100"/>
-              <a:buFont typeface="Arial"/>
-              <a:buNone/>
-            </a:pPr>
-            <a:r>
-              <a:rPr lang="en-IN" sz="1200" dirty="0">
-                <a:latin typeface="Roboto Mono"/>
-                <a:ea typeface="Roboto Mono"/>
-                <a:cs typeface="Roboto Mono"/>
-                <a:sym typeface="Roboto Mono"/>
-              </a:rPr>
-              <a:t>Capture design/ solution decisions (like tech stack choices) at a high level. Add a basic pro/con list which you have used to come to a conclusion. Link additional reading material, if applicable.</a:t>
-            </a:r>
-          </a:p>
-          <a:p>
-            <a:pPr marL="0" lvl="0" indent="0" algn="l" rtl="0">
-              <a:spcBef>
-                <a:spcPts val="0"/>
-              </a:spcBef>
-              <a:spcAft>
-                <a:spcPts val="0"/>
-              </a:spcAft>
-              <a:buClr>
-                <a:schemeClr val="dk1"/>
-              </a:buClr>
-              <a:buSzPts val="1100"/>
-              <a:buFont typeface="Arial"/>
-              <a:buNone/>
-            </a:pPr>
-            <a:endParaRPr lang="en-IN" sz="1200" dirty="0">
-              <a:latin typeface="Roboto Mono"/>
-              <a:ea typeface="Roboto Mono"/>
-              <a:cs typeface="Roboto Mono"/>
-              <a:sym typeface="Roboto Mono"/>
-            </a:endParaRPr>
-          </a:p>
-          <a:p>
-            <a:pPr marL="0" lvl="0" indent="0" algn="l" rtl="0">
-              <a:spcBef>
-                <a:spcPts val="0"/>
-              </a:spcBef>
-              <a:spcAft>
-                <a:spcPts val="0"/>
-              </a:spcAft>
-              <a:buNone/>
-            </a:pPr>
-            <a:endParaRPr lang="en-IN" sz="1200" dirty="0">
-              <a:latin typeface="Roboto Mono"/>
-              <a:ea typeface="Roboto Mono"/>
-              <a:cs typeface="Roboto Mono"/>
-              <a:sym typeface="Roboto Mono"/>
-            </a:endParaRPr>
-          </a:p>
-          <a:p>
-            <a:pPr marL="0" lvl="0" indent="0" algn="l" rtl="0">
-              <a:spcBef>
-                <a:spcPts val="0"/>
-              </a:spcBef>
-              <a:spcAft>
-                <a:spcPts val="0"/>
-              </a:spcAft>
-              <a:buNone/>
-            </a:pPr>
-            <a:endParaRPr lang="en-IN" sz="1200" dirty="0">
-              <a:latin typeface="Roboto Mono"/>
-              <a:ea typeface="Roboto Mono"/>
-              <a:cs typeface="Roboto Mono"/>
-              <a:sym typeface="Roboto Mono"/>
-            </a:endParaRPr>
-          </a:p>
-          <a:p>
-            <a:pPr marL="0" lvl="0" indent="0" algn="l" rtl="0">
-              <a:spcBef>
-                <a:spcPts val="0"/>
-              </a:spcBef>
-              <a:spcAft>
-                <a:spcPts val="0"/>
-              </a:spcAft>
-              <a:buNone/>
-            </a:pPr>
-            <a:endParaRPr lang="en-IN" sz="1200" dirty="0">
-              <a:latin typeface="Roboto Mono"/>
-              <a:ea typeface="Roboto Mono"/>
-              <a:cs typeface="Roboto Mono"/>
-              <a:sym typeface="Roboto Mono"/>
-            </a:endParaRPr>
-          </a:p>
-          <a:p>
-            <a:pPr marL="0" lvl="0" indent="0" algn="l" rtl="0">
-              <a:spcBef>
-                <a:spcPts val="0"/>
-              </a:spcBef>
-              <a:spcAft>
-                <a:spcPts val="0"/>
-              </a:spcAft>
-              <a:buNone/>
-            </a:pPr>
-            <a:endParaRPr lang="en-IN" sz="1200" dirty="0">
-              <a:latin typeface="Roboto Mono"/>
-              <a:ea typeface="Roboto Mono"/>
-              <a:cs typeface="Roboto Mono"/>
-              <a:sym typeface="Roboto Mono"/>
-            </a:endParaRPr>
-          </a:p>
-          <a:p>
-            <a:pPr marL="0" lvl="0" indent="0" algn="l" rtl="0">
-              <a:spcBef>
-                <a:spcPts val="0"/>
-              </a:spcBef>
-              <a:spcAft>
-                <a:spcPts val="0"/>
-              </a:spcAft>
-              <a:buNone/>
-            </a:pPr>
-            <a:endParaRPr lang="en-IN" sz="1200" dirty="0">
-              <a:latin typeface="Roboto Mono"/>
-              <a:ea typeface="Roboto Mono"/>
-              <a:cs typeface="Roboto Mono"/>
-              <a:sym typeface="Roboto Mono"/>
-            </a:endParaRPr>
-          </a:p>
-          <a:p>
-            <a:pPr marL="0" lvl="0" indent="0" algn="l" rtl="0">
-              <a:spcBef>
-                <a:spcPts val="0"/>
-              </a:spcBef>
-              <a:spcAft>
-                <a:spcPts val="0"/>
-              </a:spcAft>
-              <a:buNone/>
-            </a:pPr>
-            <a:endParaRPr lang="en-IN" sz="1200" dirty="0">
-              <a:latin typeface="Roboto Mono"/>
-              <a:ea typeface="Roboto Mono"/>
-              <a:cs typeface="Roboto Mono"/>
-              <a:sym typeface="Roboto Mono"/>
-            </a:endParaRPr>
-          </a:p>
-          <a:p>
-            <a:pPr marL="0" lvl="0" indent="0" algn="l" rtl="0">
-              <a:spcBef>
-                <a:spcPts val="0"/>
-              </a:spcBef>
-              <a:spcAft>
-                <a:spcPts val="0"/>
-              </a:spcAft>
-              <a:buNone/>
-            </a:pPr>
-            <a:endParaRPr lang="en-IN" sz="1200" dirty="0">
-              <a:latin typeface="Roboto Mono"/>
-              <a:ea typeface="Roboto Mono"/>
-              <a:cs typeface="Roboto Mono"/>
-              <a:sym typeface="Roboto Mono"/>
-            </a:endParaRPr>
-          </a:p>
-          <a:p>
-            <a:pPr marL="0" lvl="0" indent="0" algn="l" rtl="0">
-              <a:spcBef>
-                <a:spcPts val="0"/>
-              </a:spcBef>
-              <a:spcAft>
-                <a:spcPts val="0"/>
-              </a:spcAft>
-              <a:buNone/>
-            </a:pPr>
-            <a:endParaRPr lang="en-IN" sz="1200" dirty="0">
-              <a:latin typeface="Roboto Mono"/>
-              <a:ea typeface="Roboto Mono"/>
-              <a:cs typeface="Roboto Mono"/>
-              <a:sym typeface="Roboto Mono"/>
-            </a:endParaRPr>
-          </a:p>
-          <a:p>
-            <a:pPr marL="0" lvl="0" indent="0" algn="l" rtl="0">
-              <a:spcBef>
-                <a:spcPts val="0"/>
-              </a:spcBef>
-              <a:spcAft>
-                <a:spcPts val="0"/>
-              </a:spcAft>
-              <a:buNone/>
-            </a:pPr>
-            <a:endParaRPr lang="en-IN" sz="1200" dirty="0">
-              <a:latin typeface="Roboto Mono"/>
-              <a:ea typeface="Roboto Mono"/>
-              <a:cs typeface="Roboto Mono"/>
-              <a:sym typeface="Roboto Mono"/>
-            </a:endParaRPr>
-          </a:p>
-          <a:p>
-            <a:pPr marL="0" lvl="0" indent="0" algn="l" rtl="0">
-              <a:spcBef>
-                <a:spcPts val="0"/>
-              </a:spcBef>
-              <a:spcAft>
-                <a:spcPts val="0"/>
-              </a:spcAft>
-              <a:buNone/>
-            </a:pPr>
-            <a:endParaRPr lang="en-IN" sz="1200" dirty="0">
-              <a:latin typeface="Roboto Mono"/>
-              <a:ea typeface="Roboto Mono"/>
-              <a:cs typeface="Roboto Mono"/>
-              <a:sym typeface="Roboto Mono"/>
-            </a:endParaRPr>
-          </a:p>
-          <a:p>
-            <a:pPr marL="0" lvl="0" indent="0" algn="l" rtl="0">
-              <a:spcBef>
-                <a:spcPts val="0"/>
-              </a:spcBef>
-              <a:spcAft>
-                <a:spcPts val="0"/>
-              </a:spcAft>
-              <a:buNone/>
-            </a:pPr>
-            <a:endParaRPr lang="en-IN" sz="1200" dirty="0">
-              <a:latin typeface="Roboto Mono"/>
-              <a:ea typeface="Roboto Mono"/>
-              <a:cs typeface="Roboto Mono"/>
-              <a:sym typeface="Roboto Mono"/>
-            </a:endParaRPr>
-          </a:p>
-        </p:txBody>
-      </p:sp>
+      </p:pic>
     </p:spTree>
   </p:cSld>
   <p:clrMapOvr>

</xml_diff>

<commit_message>
Update GRiD_ Fashion Intelligence Systems_The Ignitors_NIT Rourkela.pptx
</commit_message>
<xml_diff>
--- a/GRiD_ Fashion Intelligence Systems_The Ignitors_NIT Rourkela.pptx
+++ b/GRiD_ Fashion Intelligence Systems_The Ignitors_NIT Rourkela.pptx
@@ -14,9 +14,9 @@
     <p:sldId id="258" r:id="rId5"/>
     <p:sldId id="260" r:id="rId6"/>
     <p:sldId id="261" r:id="rId7"/>
-    <p:sldId id="266" r:id="rId8"/>
-    <p:sldId id="272" r:id="rId9"/>
-    <p:sldId id="271" r:id="rId10"/>
+    <p:sldId id="271" r:id="rId8"/>
+    <p:sldId id="266" r:id="rId9"/>
+    <p:sldId id="272" r:id="rId10"/>
     <p:sldId id="262" r:id="rId11"/>
     <p:sldId id="267" r:id="rId12"/>
     <p:sldId id="263" r:id="rId13"/>
@@ -27,28 +27,28 @@
   <p:notesSz cx="6858000" cy="9144000"/>
   <p:embeddedFontLst>
     <p:embeddedFont>
-      <p:font typeface="Cambria" panose="02040503050406030204" pitchFamily="18" charset="0"/>
+      <p:font typeface="Calibri" panose="020F0502020204030204" pitchFamily="34" charset="0"/>
       <p:regular r:id="rId17"/>
       <p:bold r:id="rId18"/>
       <p:italic r:id="rId19"/>
       <p:boldItalic r:id="rId20"/>
     </p:embeddedFont>
     <p:embeddedFont>
-      <p:font typeface="Proxima Nova" panose="020B0604020202020204" charset="0"/>
+      <p:font typeface="Cambria" panose="02040503050406030204" pitchFamily="18" charset="0"/>
       <p:regular r:id="rId21"/>
       <p:bold r:id="rId22"/>
       <p:italic r:id="rId23"/>
       <p:boldItalic r:id="rId24"/>
     </p:embeddedFont>
     <p:embeddedFont>
-      <p:font typeface="Roboto Mono" panose="020B0604020202020204" charset="0"/>
+      <p:font typeface="Proxima Nova" panose="020B0604020202020204" charset="0"/>
       <p:regular r:id="rId25"/>
       <p:bold r:id="rId26"/>
       <p:italic r:id="rId27"/>
       <p:boldItalic r:id="rId28"/>
     </p:embeddedFont>
     <p:embeddedFont>
-      <p:font typeface="Calibri" panose="020F0502020204030204" pitchFamily="34" charset="0"/>
+      <p:font typeface="Quattrocento Sans" panose="020B0604020202020204" charset="0"/>
       <p:regular r:id="rId29"/>
       <p:bold r:id="rId30"/>
       <p:italic r:id="rId31"/>
@@ -62,7 +62,7 @@
       <p:boldItalic r:id="rId36"/>
     </p:embeddedFont>
     <p:embeddedFont>
-      <p:font typeface="Quattrocento Sans" panose="020B0604020202020204" charset="0"/>
+      <p:font typeface="Roboto Mono" panose="020B0604020202020204" charset="0"/>
       <p:regular r:id="rId37"/>
       <p:bold r:id="rId38"/>
       <p:italic r:id="rId39"/>
@@ -1791,6 +1791,11 @@
         </p:txBody>
       </p:sp>
     </p:spTree>
+    <p:extLst>
+      <p:ext uri="{BB962C8B-B14F-4D97-AF65-F5344CB8AC3E}">
+        <p14:creationId xmlns:p14="http://schemas.microsoft.com/office/powerpoint/2010/main" val="1375538993"/>
+      </p:ext>
+    </p:extLst>
   </p:cSld>
   <p:clrMapOvr>
     <a:masterClrMapping/>
@@ -1895,11 +1900,6 @@
         </p:txBody>
       </p:sp>
     </p:spTree>
-    <p:extLst>
-      <p:ext uri="{BB962C8B-B14F-4D97-AF65-F5344CB8AC3E}">
-        <p14:creationId xmlns:p14="http://schemas.microsoft.com/office/powerpoint/2010/main" val="1699912441"/>
-      </p:ext>
-    </p:extLst>
   </p:cSld>
   <p:clrMapOvr>
     <a:masterClrMapping/>
@@ -2006,7 +2006,7 @@
     </p:spTree>
     <p:extLst>
       <p:ext uri="{BB962C8B-B14F-4D97-AF65-F5344CB8AC3E}">
-        <p14:creationId xmlns:p14="http://schemas.microsoft.com/office/powerpoint/2010/main" val="1375538993"/>
+        <p14:creationId xmlns:p14="http://schemas.microsoft.com/office/powerpoint/2010/main" val="1699912441"/>
       </p:ext>
     </p:extLst>
   </p:cSld>
@@ -19819,11 +19819,7 @@
           <a:p>
             <a:r>
               <a:rPr lang="en-US" dirty="0"/>
-              <a:t>identify trending fashion </a:t>
-            </a:r>
-            <a:r>
-              <a:rPr lang="en-US" dirty="0" smtClean="0"/>
-              <a:t>products</a:t>
+              <a:t>identify trending fashion products</a:t>
             </a:r>
             <a:endParaRPr lang="en-IN" dirty="0"/>
           </a:p>
@@ -19953,7 +19949,7 @@
           <a:p>
             <a:pPr algn="ctr"/>
             <a:r>
-              <a:rPr lang="en-US" sz="1200" b="0" cap="none" spc="0" dirty="0" smtClean="0">
+              <a:rPr lang="en-US" sz="1200" b="0" cap="none" spc="0" dirty="0">
                 <a:ln w="0"/>
                 <a:solidFill>
                   <a:schemeClr val="tx1"/>
@@ -19972,7 +19968,7 @@
           <a:p>
             <a:pPr algn="ctr"/>
             <a:r>
-              <a:rPr lang="en-US" sz="1200" b="0" cap="none" spc="0" dirty="0" smtClean="0">
+              <a:rPr lang="en-US" sz="1200" b="0" cap="none" spc="0" dirty="0">
                 <a:ln w="0"/>
                 <a:solidFill>
                   <a:schemeClr val="tx1"/>
@@ -19987,19 +19983,6 @@
               </a:rPr>
               <a:t>sites</a:t>
             </a:r>
-            <a:endParaRPr lang="en-US" sz="1200" b="0" cap="none" spc="0" dirty="0">
-              <a:ln w="0"/>
-              <a:solidFill>
-                <a:schemeClr val="tx1"/>
-              </a:solidFill>
-              <a:effectLst>
-                <a:outerShdw blurRad="38100" dist="19050" dir="2700000" algn="tl" rotWithShape="0">
-                  <a:schemeClr val="dk1">
-                    <a:alpha val="40000"/>
-                  </a:schemeClr>
-                </a:outerShdw>
-              </a:effectLst>
-            </a:endParaRPr>
           </a:p>
         </p:txBody>
       </p:sp>
@@ -20027,7 +20010,7 @@
           <a:p>
             <a:pPr algn="ctr"/>
             <a:r>
-              <a:rPr lang="en-US" sz="1200" b="0" cap="none" spc="0" dirty="0" smtClean="0">
+              <a:rPr lang="en-US" sz="1200" b="0" cap="none" spc="0" dirty="0">
                 <a:ln w="0"/>
                 <a:solidFill>
                   <a:schemeClr val="tx1"/>
@@ -20042,19 +20025,6 @@
               </a:rPr>
               <a:t>blogs/magazines</a:t>
             </a:r>
-            <a:endParaRPr lang="en-US" sz="1200" b="0" cap="none" spc="0" dirty="0">
-              <a:ln w="0"/>
-              <a:solidFill>
-                <a:schemeClr val="tx1"/>
-              </a:solidFill>
-              <a:effectLst>
-                <a:outerShdw blurRad="38100" dist="19050" dir="2700000" algn="tl" rotWithShape="0">
-                  <a:schemeClr val="dk1">
-                    <a:alpha val="40000"/>
-                  </a:schemeClr>
-                </a:outerShdw>
-              </a:effectLst>
-            </a:endParaRPr>
           </a:p>
         </p:txBody>
       </p:sp>
@@ -20082,7 +20052,7 @@
           <a:p>
             <a:pPr algn="ctr"/>
             <a:r>
-              <a:rPr lang="en-US" sz="1200" b="0" cap="none" spc="0" dirty="0" smtClean="0">
+              <a:rPr lang="en-US" sz="1200" b="0" cap="none" spc="0" dirty="0">
                 <a:ln w="0"/>
                 <a:solidFill>
                   <a:schemeClr val="tx1"/>
@@ -20097,19 +20067,6 @@
               </a:rPr>
               <a:t>Dashboard display for designers/ retailers</a:t>
             </a:r>
-            <a:endParaRPr lang="en-US" sz="1200" b="0" cap="none" spc="0" dirty="0">
-              <a:ln w="0"/>
-              <a:solidFill>
-                <a:schemeClr val="tx1"/>
-              </a:solidFill>
-              <a:effectLst>
-                <a:outerShdw blurRad="38100" dist="19050" dir="2700000" algn="tl" rotWithShape="0">
-                  <a:schemeClr val="dk1">
-                    <a:alpha val="40000"/>
-                  </a:schemeClr>
-                </a:outerShdw>
-              </a:effectLst>
-            </a:endParaRPr>
           </a:p>
         </p:txBody>
       </p:sp>
@@ -20152,24 +20109,11 @@
               </a:rPr>
               <a:t>Ranking the products based on </a:t>
             </a:r>
-            <a:endParaRPr lang="en-US" sz="1200" dirty="0" smtClean="0">
-              <a:ln w="0"/>
-              <a:solidFill>
-                <a:schemeClr val="tx1"/>
-              </a:solidFill>
-              <a:effectLst>
-                <a:outerShdw blurRad="38100" dist="19050" dir="2700000" algn="tl" rotWithShape="0">
-                  <a:schemeClr val="dk1">
-                    <a:alpha val="40000"/>
-                  </a:schemeClr>
-                </a:outerShdw>
-              </a:effectLst>
-            </a:endParaRPr>
           </a:p>
           <a:p>
             <a:pPr algn="ctr"/>
             <a:r>
-              <a:rPr lang="en-US" sz="1200" dirty="0" smtClean="0">
+              <a:rPr lang="en-US" sz="1200" dirty="0">
                 <a:ln w="0"/>
                 <a:solidFill>
                   <a:schemeClr val="tx1"/>
@@ -20182,23 +20126,7 @@
                   </a:outerShdw>
                 </a:effectLst>
               </a:rPr>
-              <a:t>various </a:t>
-            </a:r>
-            <a:r>
-              <a:rPr lang="en-US" sz="1200" dirty="0">
-                <a:ln w="0"/>
-                <a:solidFill>
-                  <a:schemeClr val="tx1"/>
-                </a:solidFill>
-                <a:effectLst>
-                  <a:outerShdw blurRad="38100" dist="19050" dir="2700000" algn="tl" rotWithShape="0">
-                    <a:schemeClr val="dk1">
-                      <a:alpha val="40000"/>
-                    </a:schemeClr>
-                  </a:outerShdw>
-                </a:effectLst>
-              </a:rPr>
-              <a:t>parameters</a:t>
+              <a:t>various parameters</a:t>
             </a:r>
             <a:endParaRPr lang="en-US" sz="1200" b="0" cap="none" spc="0" dirty="0">
               <a:ln w="0"/>
@@ -20280,7 +20208,7 @@
           <a:p>
             <a:pPr algn="ctr"/>
             <a:r>
-              <a:rPr lang="en-US" sz="1200" b="0" cap="none" spc="0" dirty="0" smtClean="0">
+              <a:rPr lang="en-US" sz="1200" b="0" cap="none" spc="0" dirty="0">
                 <a:ln w="0"/>
                 <a:solidFill>
                   <a:schemeClr val="tx1"/>
@@ -20295,19 +20223,6 @@
               </a:rPr>
               <a:t>database</a:t>
             </a:r>
-            <a:endParaRPr lang="en-US" sz="1200" b="0" cap="none" spc="0" dirty="0">
-              <a:ln w="0"/>
-              <a:solidFill>
-                <a:schemeClr val="tx1"/>
-              </a:solidFill>
-              <a:effectLst>
-                <a:outerShdw blurRad="38100" dist="19050" dir="2700000" algn="tl" rotWithShape="0">
-                  <a:schemeClr val="dk1">
-                    <a:alpha val="40000"/>
-                  </a:schemeClr>
-                </a:outerShdw>
-              </a:effectLst>
-            </a:endParaRPr>
           </a:p>
         </p:txBody>
       </p:sp>
@@ -20405,7 +20320,7 @@
           <a:p>
             <a:pPr algn="ctr"/>
             <a:r>
-              <a:rPr lang="en-US" sz="1200" dirty="0" smtClean="0">
+              <a:rPr lang="en-US" sz="1200" dirty="0">
                 <a:ln w="0"/>
                 <a:solidFill>
                   <a:schemeClr val="tx1"/>
@@ -20473,69 +20388,8 @@
                   </a:outerShdw>
                 </a:effectLst>
               </a:rPr>
-              <a:t>Getting Rid of </a:t>
+              <a:t>Getting Rid of outdated styles from DB.</a:t>
             </a:r>
-            <a:r>
-              <a:rPr lang="en-US" sz="1200" dirty="0" smtClean="0">
-                <a:ln w="0"/>
-                <a:solidFill>
-                  <a:schemeClr val="tx1"/>
-                </a:solidFill>
-                <a:effectLst>
-                  <a:outerShdw blurRad="38100" dist="19050" dir="2700000" algn="tl" rotWithShape="0">
-                    <a:schemeClr val="dk1">
-                      <a:alpha val="40000"/>
-                    </a:schemeClr>
-                  </a:outerShdw>
-                </a:effectLst>
-              </a:rPr>
-              <a:t>outdated styles </a:t>
-            </a:r>
-            <a:r>
-              <a:rPr lang="en-US" sz="1200" dirty="0">
-                <a:ln w="0"/>
-                <a:solidFill>
-                  <a:schemeClr val="tx1"/>
-                </a:solidFill>
-                <a:effectLst>
-                  <a:outerShdw blurRad="38100" dist="19050" dir="2700000" algn="tl" rotWithShape="0">
-                    <a:schemeClr val="dk1">
-                      <a:alpha val="40000"/>
-                    </a:schemeClr>
-                  </a:outerShdw>
-                </a:effectLst>
-              </a:rPr>
-              <a:t>from </a:t>
-            </a:r>
-            <a:r>
-              <a:rPr lang="en-US" sz="1200" dirty="0" smtClean="0">
-                <a:ln w="0"/>
-                <a:solidFill>
-                  <a:schemeClr val="tx1"/>
-                </a:solidFill>
-                <a:effectLst>
-                  <a:outerShdw blurRad="38100" dist="19050" dir="2700000" algn="tl" rotWithShape="0">
-                    <a:schemeClr val="dk1">
-                      <a:alpha val="40000"/>
-                    </a:schemeClr>
-                  </a:outerShdw>
-                </a:effectLst>
-              </a:rPr>
-              <a:t>DB.</a:t>
-            </a:r>
-            <a:endParaRPr lang="en-US" sz="1200" dirty="0">
-              <a:ln w="0"/>
-              <a:solidFill>
-                <a:schemeClr val="tx1"/>
-              </a:solidFill>
-              <a:effectLst>
-                <a:outerShdw blurRad="38100" dist="19050" dir="2700000" algn="tl" rotWithShape="0">
-                  <a:schemeClr val="dk1">
-                    <a:alpha val="40000"/>
-                  </a:schemeClr>
-                </a:outerShdw>
-              </a:effectLst>
-            </a:endParaRPr>
           </a:p>
         </p:txBody>
       </p:sp>
@@ -20706,29 +20560,13 @@
                   </a:outerShdw>
                 </a:effectLst>
               </a:rPr>
-              <a:t>Ensuring quicker response </a:t>
-            </a:r>
-            <a:r>
-              <a:rPr lang="en-US" sz="1200" dirty="0" smtClean="0">
-                <a:ln w="0"/>
-                <a:solidFill>
-                  <a:schemeClr val="tx1"/>
-                </a:solidFill>
-                <a:effectLst>
-                  <a:outerShdw blurRad="38100" dist="19050" dir="2700000" algn="tl" rotWithShape="0">
-                    <a:schemeClr val="dk1">
-                      <a:alpha val="40000"/>
-                    </a:schemeClr>
-                  </a:outerShdw>
-                </a:effectLst>
-              </a:rPr>
-              <a:t>to</a:t>
+              <a:t>Ensuring quicker response to</a:t>
             </a:r>
           </a:p>
           <a:p>
             <a:pPr algn="ctr"/>
             <a:r>
-              <a:rPr lang="en-US" sz="1200" b="0" cap="none" spc="0" dirty="0" smtClean="0">
+              <a:rPr lang="en-US" sz="1200" b="0" cap="none" spc="0" dirty="0">
                 <a:ln w="0"/>
                 <a:solidFill>
                   <a:schemeClr val="tx1"/>
@@ -20743,19 +20581,6 @@
               </a:rPr>
               <a:t>request</a:t>
             </a:r>
-            <a:endParaRPr lang="en-US" sz="1200" b="0" cap="none" spc="0" dirty="0">
-              <a:ln w="0"/>
-              <a:solidFill>
-                <a:schemeClr val="tx1"/>
-              </a:solidFill>
-              <a:effectLst>
-                <a:outerShdw blurRad="38100" dist="19050" dir="2700000" algn="tl" rotWithShape="0">
-                  <a:schemeClr val="dk1">
-                    <a:alpha val="40000"/>
-                  </a:schemeClr>
-                </a:outerShdw>
-              </a:effectLst>
-            </a:endParaRPr>
           </a:p>
         </p:txBody>
       </p:sp>
@@ -20796,10 +20621,13 @@
                   </a:outerShdw>
                 </a:effectLst>
               </a:rPr>
-              <a:t>through a </a:t>
+              <a:t>through a multiprocessing</a:t>
             </a:r>
+          </a:p>
+          <a:p>
+            <a:pPr algn="ctr"/>
             <a:r>
-              <a:rPr lang="en-US" sz="1200" dirty="0" smtClean="0">
+              <a:rPr lang="en-US" sz="1200" dirty="0">
                 <a:ln w="0"/>
                 <a:solidFill>
                   <a:schemeClr val="tx1"/>
@@ -20812,42 +20640,7 @@
                   </a:outerShdw>
                 </a:effectLst>
               </a:rPr>
-              <a:t>multiprocessing</a:t>
-            </a:r>
-          </a:p>
-          <a:p>
-            <a:pPr algn="ctr"/>
-            <a:r>
-              <a:rPr lang="en-US" sz="1200" dirty="0" smtClean="0">
-                <a:ln w="0"/>
-                <a:solidFill>
-                  <a:schemeClr val="tx1"/>
-                </a:solidFill>
-                <a:effectLst>
-                  <a:outerShdw blurRad="38100" dist="19050" dir="2700000" algn="tl" rotWithShape="0">
-                    <a:schemeClr val="dk1">
-                      <a:alpha val="40000"/>
-                    </a:schemeClr>
-                  </a:outerShdw>
-                </a:effectLst>
-              </a:rPr>
-              <a:t> </a:t>
-            </a:r>
-            <a:r>
-              <a:rPr lang="en-US" sz="1200" dirty="0">
-                <a:ln w="0"/>
-                <a:solidFill>
-                  <a:schemeClr val="tx1"/>
-                </a:solidFill>
-                <a:effectLst>
-                  <a:outerShdw blurRad="38100" dist="19050" dir="2700000" algn="tl" rotWithShape="0">
-                    <a:schemeClr val="dk1">
-                      <a:alpha val="40000"/>
-                    </a:schemeClr>
-                  </a:outerShdw>
-                </a:effectLst>
-              </a:rPr>
-              <a:t>server</a:t>
+              <a:t> server</a:t>
             </a:r>
             <a:endParaRPr lang="en-US" sz="1200" b="0" cap="none" spc="0" dirty="0">
               <a:ln w="0"/>
@@ -20889,7 +20682,7 @@
           <a:p>
             <a:pPr algn="ctr"/>
             <a:r>
-              <a:rPr lang="en-US" sz="1200" b="0" cap="none" spc="0" dirty="0" smtClean="0">
+              <a:rPr lang="en-US" sz="1200" b="0" cap="none" spc="0" dirty="0">
                 <a:ln w="0"/>
                 <a:solidFill>
                   <a:schemeClr val="tx1"/>
@@ -20904,19 +20697,6 @@
               </a:rPr>
               <a:t>Designer/Retailer</a:t>
             </a:r>
-            <a:endParaRPr lang="en-US" sz="1200" b="0" cap="none" spc="0" dirty="0">
-              <a:ln w="0"/>
-              <a:solidFill>
-                <a:schemeClr val="tx1"/>
-              </a:solidFill>
-              <a:effectLst>
-                <a:outerShdw blurRad="38100" dist="19050" dir="2700000" algn="tl" rotWithShape="0">
-                  <a:schemeClr val="dk1">
-                    <a:alpha val="40000"/>
-                  </a:schemeClr>
-                </a:outerShdw>
-              </a:effectLst>
-            </a:endParaRPr>
           </a:p>
         </p:txBody>
       </p:sp>
@@ -21097,7 +20877,7 @@
                 <a:cs typeface="Roboto Mono"/>
                 <a:sym typeface="Roboto Mono"/>
               </a:rPr>
-              <a:t>Handling Client Requests &amp; Processing</a:t>
+              <a:t>Scoring/Ranking Algorithm</a:t>
             </a:r>
             <a:endParaRPr sz="2400" b="1" dirty="0">
               <a:latin typeface="Roboto Mono"/>
@@ -21110,85 +20890,44 @@
       </p:sp>
       <p:pic>
         <p:nvPicPr>
-          <p:cNvPr id="3" name="Picture 2">
+          <p:cNvPr id="5" name="Picture 4">
             <a:extLst>
               <a:ext uri="{FF2B5EF4-FFF2-40B4-BE49-F238E27FC236}">
-                <a16:creationId xmlns:a16="http://schemas.microsoft.com/office/drawing/2014/main" id="{31F4629A-1291-4999-86F3-725121456CA4}"/>
+                <a16:creationId xmlns:a16="http://schemas.microsoft.com/office/drawing/2014/main" id="{D94DFD25-4788-4F45-ABF0-FD15A3C2EE7A}"/>
               </a:ext>
             </a:extLst>
           </p:cNvPr>
-          <p:cNvPicPr>
-            <a:picLocks noChangeAspect="1"/>
-          </p:cNvPicPr>
+          <p:cNvPicPr/>
           <p:nvPr/>
         </p:nvPicPr>
         <p:blipFill>
-          <a:blip r:embed="rId4"/>
+          <a:blip r:embed="rId4" cstate="print">
+            <a:extLst>
+              <a:ext uri="{28A0092B-C50C-407E-A947-70E740481C1C}">
+                <a14:useLocalDpi xmlns:a14="http://schemas.microsoft.com/office/drawing/2010/main" val="0"/>
+              </a:ext>
+            </a:extLst>
+          </a:blip>
           <a:stretch>
             <a:fillRect/>
           </a:stretch>
         </p:blipFill>
         <p:spPr>
           <a:xfrm>
-            <a:off x="518084" y="631024"/>
-            <a:ext cx="6527681" cy="4189834"/>
+            <a:off x="179173" y="630194"/>
+            <a:ext cx="8828952" cy="4158049"/>
           </a:xfrm>
           <a:prstGeom prst="rect">
             <a:avLst/>
           </a:prstGeom>
         </p:spPr>
       </p:pic>
-      <p:sp>
-        <p:nvSpPr>
-          <p:cNvPr id="2" name="TextBox 1">
-            <a:extLst>
-              <a:ext uri="{FF2B5EF4-FFF2-40B4-BE49-F238E27FC236}">
-                <a16:creationId xmlns:a16="http://schemas.microsoft.com/office/drawing/2014/main" id="{F0AB2301-6FA9-4C18-868F-EDE4B02C86DB}"/>
-              </a:ext>
-            </a:extLst>
-          </p:cNvPr>
-          <p:cNvSpPr txBox="1"/>
-          <p:nvPr/>
-        </p:nvSpPr>
-        <p:spPr>
-          <a:xfrm>
-            <a:off x="6542903" y="982362"/>
-            <a:ext cx="2292178" cy="1169551"/>
-          </a:xfrm>
-          <a:prstGeom prst="rect">
-            <a:avLst/>
-          </a:prstGeom>
-          <a:noFill/>
-        </p:spPr>
-        <p:txBody>
-          <a:bodyPr wrap="square" rtlCol="0">
-            <a:spAutoFit/>
-          </a:bodyPr>
-          <a:lstStyle/>
-          <a:p>
-            <a:r>
-              <a:rPr lang="en-IN" b="1" dirty="0"/>
-              <a:t>Important</a:t>
-            </a:r>
-          </a:p>
-          <a:p>
-            <a:r>
-              <a:rPr lang="en-IN" dirty="0"/>
-              <a:t>Link to Detailed Scoring/Ranking Algorithm on Server Side:-</a:t>
-            </a:r>
-          </a:p>
-          <a:p>
-            <a:r>
-              <a:rPr lang="en-IN" dirty="0" err="1" smtClean="0">
-                <a:hlinkClick r:id="rId5"/>
-              </a:rPr>
-              <a:t>Grid_extras</a:t>
-            </a:r>
-            <a:endParaRPr lang="en-IN" dirty="0"/>
-          </a:p>
-        </p:txBody>
-      </p:sp>
     </p:spTree>
+    <p:extLst>
+      <p:ext uri="{BB962C8B-B14F-4D97-AF65-F5344CB8AC3E}">
+        <p14:creationId xmlns:p14="http://schemas.microsoft.com/office/powerpoint/2010/main" val="1294608854"/>
+      </p:ext>
+    </p:extLst>
   </p:cSld>
   <p:clrMapOvr>
     <a:masterClrMapping/>
@@ -21282,7 +21021,7 @@
                 <a:cs typeface="Roboto Mono"/>
                 <a:sym typeface="Roboto Mono"/>
               </a:rPr>
-              <a:t>Data Storage, Security &amp; Rendering</a:t>
+              <a:t>Handling Client Requests &amp; Processing</a:t>
             </a:r>
             <a:endParaRPr sz="2400" b="1" dirty="0">
               <a:latin typeface="Roboto Mono"/>
@@ -21295,10 +21034,10 @@
       </p:sp>
       <p:pic>
         <p:nvPicPr>
-          <p:cNvPr id="4" name="Picture 3">
+          <p:cNvPr id="3" name="Picture 2">
             <a:extLst>
               <a:ext uri="{FF2B5EF4-FFF2-40B4-BE49-F238E27FC236}">
-                <a16:creationId xmlns:a16="http://schemas.microsoft.com/office/drawing/2014/main" id="{7D9837E4-0171-42AB-B7A5-FE0AEC13B566}"/>
+                <a16:creationId xmlns:a16="http://schemas.microsoft.com/office/drawing/2014/main" id="{31F4629A-1291-4999-86F3-725121456CA4}"/>
               </a:ext>
             </a:extLst>
           </p:cNvPr>
@@ -21315,20 +21054,65 @@
         </p:blipFill>
         <p:spPr>
           <a:xfrm>
-            <a:off x="0" y="696686"/>
-            <a:ext cx="9144000" cy="4108676"/>
+            <a:off x="518084" y="631024"/>
+            <a:ext cx="6527681" cy="4189834"/>
           </a:xfrm>
           <a:prstGeom prst="rect">
             <a:avLst/>
           </a:prstGeom>
         </p:spPr>
       </p:pic>
+      <p:sp>
+        <p:nvSpPr>
+          <p:cNvPr id="2" name="TextBox 1">
+            <a:extLst>
+              <a:ext uri="{FF2B5EF4-FFF2-40B4-BE49-F238E27FC236}">
+                <a16:creationId xmlns:a16="http://schemas.microsoft.com/office/drawing/2014/main" id="{F0AB2301-6FA9-4C18-868F-EDE4B02C86DB}"/>
+              </a:ext>
+            </a:extLst>
+          </p:cNvPr>
+          <p:cNvSpPr txBox="1"/>
+          <p:nvPr/>
+        </p:nvSpPr>
+        <p:spPr>
+          <a:xfrm>
+            <a:off x="6542903" y="982362"/>
+            <a:ext cx="2292178" cy="1384995"/>
+          </a:xfrm>
+          <a:prstGeom prst="rect">
+            <a:avLst/>
+          </a:prstGeom>
+          <a:noFill/>
+        </p:spPr>
+        <p:txBody>
+          <a:bodyPr wrap="square" rtlCol="0">
+            <a:spAutoFit/>
+          </a:bodyPr>
+          <a:lstStyle/>
+          <a:p>
+            <a:r>
+              <a:rPr lang="en-IN" b="1" dirty="0"/>
+              <a:t>Important</a:t>
+            </a:r>
+          </a:p>
+          <a:p>
+            <a:r>
+              <a:rPr lang="en-IN" dirty="0"/>
+              <a:t>Link to Detailed Workflow/UI &amp; Experimentations performed:-</a:t>
+            </a:r>
+          </a:p>
+          <a:p>
+            <a:r>
+              <a:rPr lang="en-IN" dirty="0" err="1">
+                <a:hlinkClick r:id="rId5"/>
+              </a:rPr>
+              <a:t>FlipKart_Grid_extras</a:t>
+            </a:r>
+            <a:endParaRPr lang="en-IN" dirty="0"/>
+          </a:p>
+        </p:txBody>
+      </p:sp>
     </p:spTree>
-    <p:extLst>
-      <p:ext uri="{BB962C8B-B14F-4D97-AF65-F5344CB8AC3E}">
-        <p14:creationId xmlns:p14="http://schemas.microsoft.com/office/powerpoint/2010/main" val="86249766"/>
-      </p:ext>
-    </p:extLst>
   </p:cSld>
   <p:clrMapOvr>
     <a:masterClrMapping/>
@@ -21422,7 +21206,7 @@
                 <a:cs typeface="Roboto Mono"/>
                 <a:sym typeface="Roboto Mono"/>
               </a:rPr>
-              <a:t>Expired Cards Deletion</a:t>
+              <a:t>Data Storage, Security &amp; Rendering</a:t>
             </a:r>
             <a:endParaRPr sz="2400" b="1" dirty="0">
               <a:latin typeface="Roboto Mono"/>
@@ -21435,10 +21219,10 @@
       </p:sp>
       <p:pic>
         <p:nvPicPr>
-          <p:cNvPr id="2" name="Picture 1">
+          <p:cNvPr id="4" name="Picture 3">
             <a:extLst>
               <a:ext uri="{FF2B5EF4-FFF2-40B4-BE49-F238E27FC236}">
-                <a16:creationId xmlns:a16="http://schemas.microsoft.com/office/drawing/2014/main" id="{F3BB9E28-2700-4FB8-A197-D89B46A272EB}"/>
+                <a16:creationId xmlns:a16="http://schemas.microsoft.com/office/drawing/2014/main" id="{7D9837E4-0171-42AB-B7A5-FE0AEC13B566}"/>
               </a:ext>
             </a:extLst>
           </p:cNvPr>
@@ -21455,8 +21239,8 @@
         </p:blipFill>
         <p:spPr>
           <a:xfrm>
-            <a:off x="0" y="659362"/>
-            <a:ext cx="9144000" cy="4247875"/>
+            <a:off x="0" y="696686"/>
+            <a:ext cx="9144000" cy="4108676"/>
           </a:xfrm>
           <a:prstGeom prst="rect">
             <a:avLst/>
@@ -21466,7 +21250,7 @@
     </p:spTree>
     <p:extLst>
       <p:ext uri="{BB962C8B-B14F-4D97-AF65-F5344CB8AC3E}">
-        <p14:creationId xmlns:p14="http://schemas.microsoft.com/office/powerpoint/2010/main" val="1294608854"/>
+        <p14:creationId xmlns:p14="http://schemas.microsoft.com/office/powerpoint/2010/main" val="86249766"/>
       </p:ext>
     </p:extLst>
   </p:cSld>

</xml_diff>